<commit_message>
updated ppt for Unit 3 and 4
</commit_message>
<xml_diff>
--- a/Unit-3/Fine_Tuning.pptx
+++ b/Unit-3/Fine_Tuning.pptx
@@ -113,6 +113,11 @@
       </a:defRPr>
     </a:lvl9pPr>
   </p:defaultTextStyle>
+  <p:extLst>
+    <p:ext uri="{EFAFB233-063F-42B5-8137-9DF3F51BA10A}">
+      <p15:sldGuideLst xmlns:p15="http://schemas.microsoft.com/office/powerpoint/2012/main"/>
+    </p:ext>
+  </p:extLst>
 </p:presentation>
 </file>
 
@@ -265,7 +270,7 @@
           <a:p>
             <a:fld id="{CCD24A70-CEB1-443E-A851-F57BEFE0BCDC}" type="datetimeFigureOut">
               <a:rPr lang="en-IN" smtClean="0"/>
-              <a:t>08-11-2024</a:t>
+              <a:t>23-11-2024</a:t>
             </a:fld>
             <a:endParaRPr lang="en-IN"/>
           </a:p>
@@ -465,7 +470,7 @@
           <a:p>
             <a:fld id="{CCD24A70-CEB1-443E-A851-F57BEFE0BCDC}" type="datetimeFigureOut">
               <a:rPr lang="en-IN" smtClean="0"/>
-              <a:t>08-11-2024</a:t>
+              <a:t>23-11-2024</a:t>
             </a:fld>
             <a:endParaRPr lang="en-IN"/>
           </a:p>
@@ -675,7 +680,7 @@
           <a:p>
             <a:fld id="{CCD24A70-CEB1-443E-A851-F57BEFE0BCDC}" type="datetimeFigureOut">
               <a:rPr lang="en-IN" smtClean="0"/>
-              <a:t>08-11-2024</a:t>
+              <a:t>23-11-2024</a:t>
             </a:fld>
             <a:endParaRPr lang="en-IN"/>
           </a:p>
@@ -875,7 +880,7 @@
           <a:p>
             <a:fld id="{CCD24A70-CEB1-443E-A851-F57BEFE0BCDC}" type="datetimeFigureOut">
               <a:rPr lang="en-IN" smtClean="0"/>
-              <a:t>08-11-2024</a:t>
+              <a:t>23-11-2024</a:t>
             </a:fld>
             <a:endParaRPr lang="en-IN"/>
           </a:p>
@@ -1151,7 +1156,7 @@
           <a:p>
             <a:fld id="{CCD24A70-CEB1-443E-A851-F57BEFE0BCDC}" type="datetimeFigureOut">
               <a:rPr lang="en-IN" smtClean="0"/>
-              <a:t>08-11-2024</a:t>
+              <a:t>23-11-2024</a:t>
             </a:fld>
             <a:endParaRPr lang="en-IN"/>
           </a:p>
@@ -1419,7 +1424,7 @@
           <a:p>
             <a:fld id="{CCD24A70-CEB1-443E-A851-F57BEFE0BCDC}" type="datetimeFigureOut">
               <a:rPr lang="en-IN" smtClean="0"/>
-              <a:t>08-11-2024</a:t>
+              <a:t>23-11-2024</a:t>
             </a:fld>
             <a:endParaRPr lang="en-IN"/>
           </a:p>
@@ -1834,7 +1839,7 @@
           <a:p>
             <a:fld id="{CCD24A70-CEB1-443E-A851-F57BEFE0BCDC}" type="datetimeFigureOut">
               <a:rPr lang="en-IN" smtClean="0"/>
-              <a:t>08-11-2024</a:t>
+              <a:t>23-11-2024</a:t>
             </a:fld>
             <a:endParaRPr lang="en-IN"/>
           </a:p>
@@ -1976,7 +1981,7 @@
           <a:p>
             <a:fld id="{CCD24A70-CEB1-443E-A851-F57BEFE0BCDC}" type="datetimeFigureOut">
               <a:rPr lang="en-IN" smtClean="0"/>
-              <a:t>08-11-2024</a:t>
+              <a:t>23-11-2024</a:t>
             </a:fld>
             <a:endParaRPr lang="en-IN"/>
           </a:p>
@@ -2089,7 +2094,7 @@
           <a:p>
             <a:fld id="{CCD24A70-CEB1-443E-A851-F57BEFE0BCDC}" type="datetimeFigureOut">
               <a:rPr lang="en-IN" smtClean="0"/>
-              <a:t>08-11-2024</a:t>
+              <a:t>23-11-2024</a:t>
             </a:fld>
             <a:endParaRPr lang="en-IN"/>
           </a:p>
@@ -2402,7 +2407,7 @@
           <a:p>
             <a:fld id="{CCD24A70-CEB1-443E-A851-F57BEFE0BCDC}" type="datetimeFigureOut">
               <a:rPr lang="en-IN" smtClean="0"/>
-              <a:t>08-11-2024</a:t>
+              <a:t>23-11-2024</a:t>
             </a:fld>
             <a:endParaRPr lang="en-IN"/>
           </a:p>
@@ -2691,7 +2696,7 @@
           <a:p>
             <a:fld id="{CCD24A70-CEB1-443E-A851-F57BEFE0BCDC}" type="datetimeFigureOut">
               <a:rPr lang="en-IN" smtClean="0"/>
-              <a:t>08-11-2024</a:t>
+              <a:t>23-11-2024</a:t>
             </a:fld>
             <a:endParaRPr lang="en-IN"/>
           </a:p>
@@ -2934,7 +2939,7 @@
           <a:p>
             <a:fld id="{CCD24A70-CEB1-443E-A851-F57BEFE0BCDC}" type="datetimeFigureOut">
               <a:rPr lang="en-IN" smtClean="0"/>
-              <a:t>08-11-2024</a:t>
+              <a:t>23-11-2024</a:t>
             </a:fld>
             <a:endParaRPr lang="en-IN"/>
           </a:p>
@@ -3542,8 +3547,7 @@
               </a:spcAft>
               <a:buClrTx/>
               <a:buSzTx/>
-              <a:buFontTx/>
-              <a:buChar char="•"/>
+              <a:buNone/>
               <a:tabLst/>
             </a:pPr>
             <a:r>
@@ -3557,7 +3561,7 @@
                 <a:effectLst/>
                 <a:latin typeface="Arial" panose="020B0604020202020204" pitchFamily="34" charset="0"/>
               </a:rPr>
-              <a:t>Full Fine-Tuning</a:t>
+              <a:t>4. Full Fine-Tuning</a:t>
             </a:r>
             <a:r>
               <a:rPr kumimoji="0" lang="en-US" altLang="en-US" sz="1800" b="0" i="0" u="none" strike="noStrike" cap="none" normalizeH="0" baseline="0" dirty="0">
@@ -3613,8 +3617,7 @@
               </a:spcAft>
               <a:buClrTx/>
               <a:buSzTx/>
-              <a:buFontTx/>
-              <a:buChar char="•"/>
+              <a:buNone/>
               <a:tabLst/>
             </a:pPr>
             <a:r>
@@ -3628,7 +3631,7 @@
                 <a:effectLst/>
                 <a:latin typeface="Arial" panose="020B0604020202020204" pitchFamily="34" charset="0"/>
               </a:rPr>
-              <a:t>Adapter-Based Fine-Tuning (e.g., </a:t>
+              <a:t>2. Adapter-Based Fine-Tuning (e.g., </a:t>
             </a:r>
             <a:r>
               <a:rPr kumimoji="0" lang="en-US" altLang="en-US" sz="1800" b="1" i="0" u="none" strike="noStrike" cap="none" normalizeH="0" baseline="0" dirty="0" err="1">
@@ -3736,8 +3739,7 @@
               </a:spcAft>
               <a:buClrTx/>
               <a:buSzTx/>
-              <a:buFontTx/>
-              <a:buChar char="•"/>
+              <a:buNone/>
               <a:tabLst/>
             </a:pPr>
             <a:r>
@@ -3751,7 +3753,7 @@
                 <a:effectLst/>
                 <a:latin typeface="Arial" panose="020B0604020202020204" pitchFamily="34" charset="0"/>
               </a:rPr>
-              <a:t>Prompt-Based Fine-Tuning and Instruction Tuning</a:t>
+              <a:t>1. Prompt-Based Fine-Tuning and Instruction Tuning</a:t>
             </a:r>
             <a:r>
               <a:rPr kumimoji="0" lang="en-US" altLang="en-US" sz="1800" b="0" i="0" u="none" strike="noStrike" cap="none" normalizeH="0" baseline="0" dirty="0">
@@ -3807,8 +3809,7 @@
               </a:spcAft>
               <a:buClrTx/>
               <a:buSzTx/>
-              <a:buFontTx/>
-              <a:buChar char="•"/>
+              <a:buNone/>
               <a:tabLst/>
             </a:pPr>
             <a:r>
@@ -3822,7 +3823,7 @@
                 <a:effectLst/>
                 <a:latin typeface="Arial" panose="020B0604020202020204" pitchFamily="34" charset="0"/>
               </a:rPr>
-              <a:t>Prefix Tuning</a:t>
+              <a:t>3. Prefix Tuning</a:t>
             </a:r>
             <a:r>
               <a:rPr kumimoji="0" lang="en-US" altLang="en-US" sz="1800" b="0" i="0" u="none" strike="noStrike" cap="none" normalizeH="0" baseline="0" dirty="0">

</xml_diff>